<commit_message>
added file diagrams slides
</commit_message>
<xml_diff>
--- a/Presentations/Presentazione.pptx
+++ b/Presentations/Presentazione.pptx
@@ -5,7 +5,7 @@
     <p:sldMasterId id="2147483648" r:id="rId1"/>
   </p:sldMasterIdLst>
   <p:notesMasterIdLst>
-    <p:notesMasterId r:id="rId18"/>
+    <p:notesMasterId r:id="rId20"/>
   </p:notesMasterIdLst>
   <p:sldIdLst>
     <p:sldId id="256" r:id="rId2"/>
@@ -18,12 +18,14 @@
     <p:sldId id="263" r:id="rId9"/>
     <p:sldId id="268" r:id="rId10"/>
     <p:sldId id="269" r:id="rId11"/>
-    <p:sldId id="270" r:id="rId12"/>
-    <p:sldId id="271" r:id="rId13"/>
-    <p:sldId id="264" r:id="rId14"/>
-    <p:sldId id="267" r:id="rId15"/>
-    <p:sldId id="265" r:id="rId16"/>
-    <p:sldId id="259" r:id="rId17"/>
+    <p:sldId id="273" r:id="rId12"/>
+    <p:sldId id="270" r:id="rId13"/>
+    <p:sldId id="271" r:id="rId14"/>
+    <p:sldId id="272" r:id="rId15"/>
+    <p:sldId id="264" r:id="rId16"/>
+    <p:sldId id="267" r:id="rId17"/>
+    <p:sldId id="265" r:id="rId18"/>
+    <p:sldId id="259" r:id="rId19"/>
   </p:sldIdLst>
   <p:sldSz cx="12192000" cy="6858000"/>
   <p:notesSz cx="6858000" cy="9144000"/>
@@ -637,7 +639,7 @@
           <a:p>
             <a:fld id="{EC946105-561A-4569-8BDB-2855F3E534B9}" type="slidenum">
               <a:rPr lang="it-IT" smtClean="0"/>
-              <a:t>14</a:t>
+              <a:t>16</a:t>
             </a:fld>
             <a:endParaRPr lang="it-IT"/>
           </a:p>
@@ -725,7 +727,7 @@
           <a:p>
             <a:fld id="{EC946105-561A-4569-8BDB-2855F3E534B9}" type="slidenum">
               <a:rPr lang="it-IT" smtClean="0"/>
-              <a:t>15</a:t>
+              <a:t>17</a:t>
             </a:fld>
             <a:endParaRPr lang="it-IT"/>
           </a:p>
@@ -813,7 +815,7 @@
           <a:p>
             <a:fld id="{EC946105-561A-4569-8BDB-2855F3E534B9}" type="slidenum">
               <a:rPr lang="it-IT" smtClean="0"/>
-              <a:t>16</a:t>
+              <a:t>18</a:t>
             </a:fld>
             <a:endParaRPr lang="it-IT"/>
           </a:p>
@@ -3836,31 +3838,49 @@
           <a:p>
             <a:r>
               <a:rPr lang="it-CH" dirty="0" smtClean="0"/>
-              <a:t>Struttura librerie.</a:t>
+              <a:t>Struttura </a:t>
+            </a:r>
+            <a:r>
+              <a:rPr lang="it-CH" dirty="0"/>
+              <a:t>c</a:t>
+            </a:r>
+            <a:r>
+              <a:rPr lang="it-CH" dirty="0" smtClean="0"/>
+              <a:t>odice.</a:t>
             </a:r>
             <a:endParaRPr lang="it-IT" dirty="0"/>
           </a:p>
         </p:txBody>
       </p:sp>
-      <p:sp>
-        <p:nvSpPr>
-          <p:cNvPr id="3" name="Segnaposto contenuto 2"/>
-          <p:cNvSpPr>
-            <a:spLocks noGrp="1"/>
-          </p:cNvSpPr>
+      <p:pic>
+        <p:nvPicPr>
+          <p:cNvPr id="4" name="Segnaposto contenuto 3"/>
+          <p:cNvPicPr>
+            <a:picLocks noGrp="1" noChangeAspect="1"/>
+          </p:cNvPicPr>
           <p:nvPr>
             <p:ph idx="1"/>
           </p:nvPr>
-        </p:nvSpPr>
-        <p:spPr/>
-        <p:txBody>
-          <a:bodyPr/>
-          <a:lstStyle/>
-          <a:p>
-            <a:endParaRPr lang="it-IT" dirty="0"/>
-          </a:p>
-        </p:txBody>
-      </p:sp>
+        </p:nvPicPr>
+        <p:blipFill>
+          <a:blip r:embed="rId2">
+            <a:extLst>
+              <a:ext uri="{28A0092B-C50C-407E-A947-70E740481C1C}">
+                <a14:useLocalDpi xmlns:a14="http://schemas.microsoft.com/office/drawing/2010/main" val="0"/>
+              </a:ext>
+            </a:extLst>
+          </a:blip>
+          <a:stretch>
+            <a:fillRect/>
+          </a:stretch>
+        </p:blipFill>
+        <p:spPr>
+          <a:xfrm>
+            <a:off x="4065436" y="1997050"/>
+            <a:ext cx="4061128" cy="3736238"/>
+          </a:xfrm>
+        </p:spPr>
+      </p:pic>
     </p:spTree>
     <p:extLst>
       <p:ext uri="{BB962C8B-B14F-4D97-AF65-F5344CB8AC3E}">
@@ -3871,6 +3891,13 @@
   <p:clrMapOvr>
     <a:masterClrMapping/>
   </p:clrMapOvr>
+  <p:timing>
+    <p:tnLst>
+      <p:par>
+        <p:cTn id="1" dur="indefinite" restart="never" nodeType="tmRoot"/>
+      </p:par>
+    </p:tnLst>
+  </p:timing>
 </p:sld>
 </file>
 
@@ -3908,167 +3935,7 @@
           <a:p>
             <a:r>
               <a:rPr lang="it-CH" dirty="0" smtClean="0"/>
-              <a:t>Libreria </a:t>
-            </a:r>
-            <a:r>
-              <a:rPr lang="it-CH" dirty="0" err="1" smtClean="0"/>
-              <a:t>functions</a:t>
-            </a:r>
-            <a:r>
-              <a:rPr lang="it-CH" dirty="0" smtClean="0"/>
-              <a:t>.</a:t>
-            </a:r>
-            <a:endParaRPr lang="it-IT" dirty="0"/>
-          </a:p>
-        </p:txBody>
-      </p:sp>
-      <p:sp>
-        <p:nvSpPr>
-          <p:cNvPr id="3" name="Segnaposto contenuto 2"/>
-          <p:cNvSpPr>
-            <a:spLocks noGrp="1"/>
-          </p:cNvSpPr>
-          <p:nvPr>
-            <p:ph idx="1"/>
-          </p:nvPr>
-        </p:nvSpPr>
-        <p:spPr/>
-        <p:txBody>
-          <a:bodyPr/>
-          <a:lstStyle/>
-          <a:p>
-            <a:endParaRPr lang="it-IT"/>
-          </a:p>
-        </p:txBody>
-      </p:sp>
-    </p:spTree>
-    <p:extLst>
-      <p:ext uri="{BB962C8B-B14F-4D97-AF65-F5344CB8AC3E}">
-        <p14:creationId xmlns:p14="http://schemas.microsoft.com/office/powerpoint/2010/main" val="2625428675"/>
-      </p:ext>
-    </p:extLst>
-  </p:cSld>
-  <p:clrMapOvr>
-    <a:masterClrMapping/>
-  </p:clrMapOvr>
-</p:sld>
-</file>
-
-<file path=ppt/slides/slide12.xml><?xml version="1.0" encoding="utf-8"?>
-<p:sld xmlns:a="http://schemas.openxmlformats.org/drawingml/2006/main" xmlns:r="http://schemas.openxmlformats.org/officeDocument/2006/relationships" xmlns:p="http://schemas.openxmlformats.org/presentationml/2006/main">
-  <p:cSld>
-    <p:spTree>
-      <p:nvGrpSpPr>
-        <p:cNvPr id="1" name=""/>
-        <p:cNvGrpSpPr/>
-        <p:nvPr/>
-      </p:nvGrpSpPr>
-      <p:grpSpPr>
-        <a:xfrm>
-          <a:off x="0" y="0"/>
-          <a:ext cx="0" cy="0"/>
-          <a:chOff x="0" y="0"/>
-          <a:chExt cx="0" cy="0"/>
-        </a:xfrm>
-      </p:grpSpPr>
-      <p:sp>
-        <p:nvSpPr>
-          <p:cNvPr id="2" name="Titolo 1"/>
-          <p:cNvSpPr>
-            <a:spLocks noGrp="1"/>
-          </p:cNvSpPr>
-          <p:nvPr>
-            <p:ph type="title"/>
-          </p:nvPr>
-        </p:nvSpPr>
-        <p:spPr/>
-        <p:txBody>
-          <a:bodyPr/>
-          <a:lstStyle/>
-          <a:p>
-            <a:r>
-              <a:rPr lang="it-CH" dirty="0" smtClean="0"/>
-              <a:t>Libreria </a:t>
-            </a:r>
-            <a:r>
-              <a:rPr lang="it-CH" dirty="0" err="1" smtClean="0"/>
-              <a:t>programs</a:t>
-            </a:r>
-            <a:r>
-              <a:rPr lang="it-CH" dirty="0" smtClean="0"/>
-              <a:t>.</a:t>
-            </a:r>
-            <a:endParaRPr lang="it-IT" dirty="0"/>
-          </a:p>
-        </p:txBody>
-      </p:sp>
-      <p:sp>
-        <p:nvSpPr>
-          <p:cNvPr id="3" name="Segnaposto contenuto 2"/>
-          <p:cNvSpPr>
-            <a:spLocks noGrp="1"/>
-          </p:cNvSpPr>
-          <p:nvPr>
-            <p:ph idx="1"/>
-          </p:nvPr>
-        </p:nvSpPr>
-        <p:spPr/>
-        <p:txBody>
-          <a:bodyPr/>
-          <a:lstStyle/>
-          <a:p>
-            <a:endParaRPr lang="it-IT"/>
-          </a:p>
-        </p:txBody>
-      </p:sp>
-    </p:spTree>
-    <p:extLst>
-      <p:ext uri="{BB962C8B-B14F-4D97-AF65-F5344CB8AC3E}">
-        <p14:creationId xmlns:p14="http://schemas.microsoft.com/office/powerpoint/2010/main" val="3341934481"/>
-      </p:ext>
-    </p:extLst>
-  </p:cSld>
-  <p:clrMapOvr>
-    <a:masterClrMapping/>
-  </p:clrMapOvr>
-</p:sld>
-</file>
-
-<file path=ppt/slides/slide13.xml><?xml version="1.0" encoding="utf-8"?>
-<p:sld xmlns:a="http://schemas.openxmlformats.org/drawingml/2006/main" xmlns:r="http://schemas.openxmlformats.org/officeDocument/2006/relationships" xmlns:p="http://schemas.openxmlformats.org/presentationml/2006/main">
-  <p:cSld>
-    <p:spTree>
-      <p:nvGrpSpPr>
-        <p:cNvPr id="1" name=""/>
-        <p:cNvGrpSpPr/>
-        <p:nvPr/>
-      </p:nvGrpSpPr>
-      <p:grpSpPr>
-        <a:xfrm>
-          <a:off x="0" y="0"/>
-          <a:ext cx="0" cy="0"/>
-          <a:chOff x="0" y="0"/>
-          <a:chExt cx="0" cy="0"/>
-        </a:xfrm>
-      </p:grpSpPr>
-      <p:sp>
-        <p:nvSpPr>
-          <p:cNvPr id="2" name="Titolo 1"/>
-          <p:cNvSpPr>
-            <a:spLocks noGrp="1"/>
-          </p:cNvSpPr>
-          <p:nvPr>
-            <p:ph type="title"/>
-          </p:nvPr>
-        </p:nvSpPr>
-        <p:spPr/>
-        <p:txBody>
-          <a:bodyPr/>
-          <a:lstStyle/>
-          <a:p>
-            <a:r>
-              <a:rPr lang="it-CH" dirty="0" smtClean="0"/>
-              <a:t>Test.</a:t>
+              <a:t>Librerie utilizzate.</a:t>
             </a:r>
             <a:endParaRPr lang="it-IT" dirty="0"/>
           </a:p>
@@ -4268,19 +4135,32 @@
           <a:p>
             <a:pPr lvl="7"/>
             <a:r>
-              <a:rPr lang="it-CH" sz="3200" dirty="0" smtClean="0"/>
-              <a:t>Test modalità</a:t>
-            </a:r>
+              <a:rPr lang="it-CH" sz="3200" dirty="0" err="1" smtClean="0"/>
+              <a:t>Wire</a:t>
+            </a:r>
+            <a:endParaRPr lang="it-CH" sz="3200" dirty="0" smtClean="0"/>
           </a:p>
           <a:p>
             <a:pPr lvl="7"/>
             <a:r>
-              <a:rPr lang="it-CH" sz="3200" dirty="0" smtClean="0"/>
-              <a:t>Test procedura di </a:t>
-            </a:r>
-            <a:r>
               <a:rPr lang="it-CH" sz="3200" dirty="0" err="1" smtClean="0"/>
-              <a:t>check</a:t>
+              <a:t>LiquidCrystal</a:t>
+            </a:r>
+            <a:endParaRPr lang="it-CH" sz="3200" dirty="0" smtClean="0"/>
+          </a:p>
+          <a:p>
+            <a:pPr lvl="7"/>
+            <a:r>
+              <a:rPr lang="it-CH" sz="3200" dirty="0" err="1" smtClean="0"/>
+              <a:t>AdaFruit</a:t>
+            </a:r>
+            <a:endParaRPr lang="it-CH" sz="3200" dirty="0" smtClean="0"/>
+          </a:p>
+          <a:p>
+            <a:pPr lvl="7"/>
+            <a:r>
+              <a:rPr lang="it-CH" sz="3200" dirty="0" err="1" smtClean="0"/>
+              <a:t>SevenSeg</a:t>
             </a:r>
             <a:r>
               <a:rPr lang="it-CH" sz="3200" dirty="0" smtClean="0"/>
@@ -4292,7 +4172,192 @@
     </p:spTree>
     <p:extLst>
       <p:ext uri="{BB962C8B-B14F-4D97-AF65-F5344CB8AC3E}">
-        <p14:creationId xmlns:p14="http://schemas.microsoft.com/office/powerpoint/2010/main" val="238423913"/>
+        <p14:creationId xmlns:p14="http://schemas.microsoft.com/office/powerpoint/2010/main" val="2216714233"/>
+      </p:ext>
+    </p:extLst>
+  </p:cSld>
+  <p:clrMapOvr>
+    <a:masterClrMapping/>
+  </p:clrMapOvr>
+</p:sld>
+</file>
+
+<file path=ppt/slides/slide12.xml><?xml version="1.0" encoding="utf-8"?>
+<p:sld xmlns:a="http://schemas.openxmlformats.org/drawingml/2006/main" xmlns:r="http://schemas.openxmlformats.org/officeDocument/2006/relationships" xmlns:p="http://schemas.openxmlformats.org/presentationml/2006/main">
+  <p:cSld>
+    <p:spTree>
+      <p:nvGrpSpPr>
+        <p:cNvPr id="1" name=""/>
+        <p:cNvGrpSpPr/>
+        <p:nvPr/>
+      </p:nvGrpSpPr>
+      <p:grpSpPr>
+        <a:xfrm>
+          <a:off x="0" y="0"/>
+          <a:ext cx="0" cy="0"/>
+          <a:chOff x="0" y="0"/>
+          <a:chExt cx="0" cy="0"/>
+        </a:xfrm>
+      </p:grpSpPr>
+      <p:sp>
+        <p:nvSpPr>
+          <p:cNvPr id="2" name="Titolo 1"/>
+          <p:cNvSpPr>
+            <a:spLocks noGrp="1"/>
+          </p:cNvSpPr>
+          <p:nvPr>
+            <p:ph type="title"/>
+          </p:nvPr>
+        </p:nvSpPr>
+        <p:spPr/>
+        <p:txBody>
+          <a:bodyPr/>
+          <a:lstStyle/>
+          <a:p>
+            <a:r>
+              <a:rPr lang="it-CH" dirty="0" smtClean="0"/>
+              <a:t>File </a:t>
+            </a:r>
+            <a:r>
+              <a:rPr lang="it-CH" dirty="0" err="1" smtClean="0"/>
+              <a:t>b_functions</a:t>
+            </a:r>
+            <a:r>
+              <a:rPr lang="it-CH" dirty="0" smtClean="0"/>
+              <a:t>.</a:t>
+            </a:r>
+            <a:endParaRPr lang="it-IT" dirty="0"/>
+          </a:p>
+        </p:txBody>
+      </p:sp>
+      <p:pic>
+        <p:nvPicPr>
+          <p:cNvPr id="4" name="Segnaposto contenuto 3"/>
+          <p:cNvPicPr>
+            <a:picLocks noGrp="1" noChangeAspect="1"/>
+          </p:cNvPicPr>
+          <p:nvPr>
+            <p:ph idx="1"/>
+          </p:nvPr>
+        </p:nvPicPr>
+        <p:blipFill rotWithShape="1">
+          <a:blip r:embed="rId2">
+            <a:extLst>
+              <a:ext uri="{28A0092B-C50C-407E-A947-70E740481C1C}">
+                <a14:useLocalDpi xmlns:a14="http://schemas.microsoft.com/office/drawing/2010/main" val="0"/>
+              </a:ext>
+            </a:extLst>
+          </a:blip>
+          <a:srcRect l="2601" t="4139" r="11408" b="17157"/>
+          <a:stretch/>
+        </p:blipFill>
+        <p:spPr>
+          <a:xfrm>
+            <a:off x="3447288" y="2229901"/>
+            <a:ext cx="5297424" cy="3322321"/>
+          </a:xfrm>
+        </p:spPr>
+      </p:pic>
+    </p:spTree>
+    <p:extLst>
+      <p:ext uri="{BB962C8B-B14F-4D97-AF65-F5344CB8AC3E}">
+        <p14:creationId xmlns:p14="http://schemas.microsoft.com/office/powerpoint/2010/main" val="2625428675"/>
+      </p:ext>
+    </p:extLst>
+  </p:cSld>
+  <p:clrMapOvr>
+    <a:masterClrMapping/>
+  </p:clrMapOvr>
+  <p:timing>
+    <p:tnLst>
+      <p:par>
+        <p:cTn id="1" dur="indefinite" restart="never" nodeType="tmRoot"/>
+      </p:par>
+    </p:tnLst>
+  </p:timing>
+</p:sld>
+</file>
+
+<file path=ppt/slides/slide13.xml><?xml version="1.0" encoding="utf-8"?>
+<p:sld xmlns:a="http://schemas.openxmlformats.org/drawingml/2006/main" xmlns:r="http://schemas.openxmlformats.org/officeDocument/2006/relationships" xmlns:p="http://schemas.openxmlformats.org/presentationml/2006/main">
+  <p:cSld>
+    <p:spTree>
+      <p:nvGrpSpPr>
+        <p:cNvPr id="1" name=""/>
+        <p:cNvGrpSpPr/>
+        <p:nvPr/>
+      </p:nvGrpSpPr>
+      <p:grpSpPr>
+        <a:xfrm>
+          <a:off x="0" y="0"/>
+          <a:ext cx="0" cy="0"/>
+          <a:chOff x="0" y="0"/>
+          <a:chExt cx="0" cy="0"/>
+        </a:xfrm>
+      </p:grpSpPr>
+      <p:sp>
+        <p:nvSpPr>
+          <p:cNvPr id="2" name="Titolo 1"/>
+          <p:cNvSpPr>
+            <a:spLocks noGrp="1"/>
+          </p:cNvSpPr>
+          <p:nvPr>
+            <p:ph type="title"/>
+          </p:nvPr>
+        </p:nvSpPr>
+        <p:spPr/>
+        <p:txBody>
+          <a:bodyPr/>
+          <a:lstStyle/>
+          <a:p>
+            <a:r>
+              <a:rPr lang="it-CH" dirty="0" smtClean="0"/>
+              <a:t>File </a:t>
+            </a:r>
+            <a:r>
+              <a:rPr lang="it-CH" dirty="0" err="1" smtClean="0"/>
+              <a:t>d_programs</a:t>
+            </a:r>
+            <a:r>
+              <a:rPr lang="it-CH" dirty="0" smtClean="0"/>
+              <a:t>.</a:t>
+            </a:r>
+            <a:endParaRPr lang="it-IT" dirty="0"/>
+          </a:p>
+        </p:txBody>
+      </p:sp>
+      <p:pic>
+        <p:nvPicPr>
+          <p:cNvPr id="4" name="Segnaposto contenuto 3"/>
+          <p:cNvPicPr>
+            <a:picLocks noGrp="1" noChangeAspect="1"/>
+          </p:cNvPicPr>
+          <p:nvPr>
+            <p:ph idx="1"/>
+          </p:nvPr>
+        </p:nvPicPr>
+        <p:blipFill rotWithShape="1">
+          <a:blip r:embed="rId2">
+            <a:extLst>
+              <a:ext uri="{28A0092B-C50C-407E-A947-70E740481C1C}">
+                <a14:useLocalDpi xmlns:a14="http://schemas.microsoft.com/office/drawing/2010/main" val="0"/>
+              </a:ext>
+            </a:extLst>
+          </a:blip>
+          <a:srcRect l="2175" t="3668" r="9803" b="14919"/>
+          <a:stretch/>
+        </p:blipFill>
+        <p:spPr>
+          <a:xfrm>
+            <a:off x="2864604" y="2072640"/>
+            <a:ext cx="6462792" cy="3931920"/>
+          </a:xfrm>
+        </p:spPr>
+      </p:pic>
+    </p:spTree>
+    <p:extLst>
+      <p:ext uri="{BB962C8B-B14F-4D97-AF65-F5344CB8AC3E}">
+        <p14:creationId xmlns:p14="http://schemas.microsoft.com/office/powerpoint/2010/main" val="3341934481"/>
       </p:ext>
     </p:extLst>
   </p:cSld>
@@ -4343,63 +4408,52 @@
           <a:p>
             <a:r>
               <a:rPr lang="it-CH" dirty="0" smtClean="0"/>
-              <a:t>Limitazioni.</a:t>
+              <a:t>File </a:t>
+            </a:r>
+            <a:r>
+              <a:rPr lang="it-CH" dirty="0" err="1" smtClean="0"/>
+              <a:t>z_main</a:t>
+            </a:r>
+            <a:r>
+              <a:rPr lang="it-CH" dirty="0" smtClean="0"/>
+              <a:t>.</a:t>
             </a:r>
             <a:endParaRPr lang="it-IT" dirty="0"/>
           </a:p>
         </p:txBody>
       </p:sp>
-      <p:sp>
-        <p:nvSpPr>
-          <p:cNvPr id="4" name="Segnaposto contenuto 2"/>
-          <p:cNvSpPr>
-            <a:spLocks noGrp="1"/>
-          </p:cNvSpPr>
+      <p:pic>
+        <p:nvPicPr>
+          <p:cNvPr id="4" name="Segnaposto contenuto 3"/>
+          <p:cNvPicPr>
+            <a:picLocks noGrp="1" noChangeAspect="1"/>
+          </p:cNvPicPr>
           <p:nvPr>
             <p:ph idx="1"/>
           </p:nvPr>
-        </p:nvSpPr>
+        </p:nvPicPr>
+        <p:blipFill rotWithShape="1">
+          <a:blip r:embed="rId2">
+            <a:extLst>
+              <a:ext uri="{28A0092B-C50C-407E-A947-70E740481C1C}">
+                <a14:useLocalDpi xmlns:a14="http://schemas.microsoft.com/office/drawing/2010/main" val="0"/>
+              </a:ext>
+            </a:extLst>
+          </a:blip>
+          <a:srcRect l="6424" t="7235" r="25625" b="31400"/>
+          <a:stretch/>
+        </p:blipFill>
         <p:spPr>
           <a:xfrm>
-            <a:off x="838200" y="1925053"/>
-            <a:ext cx="10515600" cy="4932947"/>
+            <a:off x="4897119" y="2702560"/>
+            <a:ext cx="2397761" cy="1808480"/>
           </a:xfrm>
         </p:spPr>
-        <p:txBody>
-          <a:bodyPr>
-            <a:normAutofit/>
-          </a:bodyPr>
-          <a:lstStyle/>
-          <a:p>
-            <a:endParaRPr lang="it-CH" sz="3200" dirty="0" smtClean="0"/>
-          </a:p>
-          <a:p>
-            <a:endParaRPr lang="it-CH" sz="3200" dirty="0"/>
-          </a:p>
-          <a:p>
-            <a:pPr lvl="7"/>
-            <a:r>
-              <a:rPr lang="it-CH" sz="3200" dirty="0" smtClean="0"/>
-              <a:t>Programma n° 5</a:t>
-            </a:r>
-          </a:p>
-          <a:p>
-            <a:pPr lvl="7"/>
-            <a:r>
-              <a:rPr lang="it-CH" sz="3200" dirty="0" smtClean="0"/>
-              <a:t>LED</a:t>
-            </a:r>
-          </a:p>
-          <a:p>
-            <a:pPr lvl="7"/>
-            <a:endParaRPr lang="it-IT" sz="3200" dirty="0"/>
-          </a:p>
-        </p:txBody>
-      </p:sp>
+      </p:pic>
     </p:spTree>
     <p:extLst>
       <p:ext uri="{BB962C8B-B14F-4D97-AF65-F5344CB8AC3E}">
-        <p14:creationId xmlns:p14="http://schemas.microsoft.com/office/powerpoint/2010/main" val="3968864345"/>
+        <p14:creationId xmlns:p14="http://schemas.microsoft.com/office/powerpoint/2010/main" val="1852533655"/>
       </p:ext>
     </p:extLst>
   </p:cSld>
@@ -4450,6 +4504,388 @@
           <a:p>
             <a:r>
               <a:rPr lang="it-CH" dirty="0" smtClean="0"/>
+              <a:t>Test.</a:t>
+            </a:r>
+            <a:endParaRPr lang="it-IT" dirty="0"/>
+          </a:p>
+        </p:txBody>
+      </p:sp>
+      <p:sp>
+        <p:nvSpPr>
+          <p:cNvPr id="5" name="Segnaposto contenuto 2"/>
+          <p:cNvSpPr txBox="1">
+            <a:spLocks/>
+          </p:cNvSpPr>
+          <p:nvPr/>
+        </p:nvSpPr>
+        <p:spPr>
+          <a:xfrm>
+            <a:off x="838200" y="1925053"/>
+            <a:ext cx="10515600" cy="4932947"/>
+          </a:xfrm>
+          <a:prstGeom prst="rect">
+            <a:avLst/>
+          </a:prstGeom>
+        </p:spPr>
+        <p:txBody>
+          <a:bodyPr vert="horz" lIns="91440" tIns="45720" rIns="91440" bIns="45720" rtlCol="0">
+            <a:normAutofit/>
+          </a:bodyPr>
+          <a:lstStyle>
+            <a:lvl1pPr marL="228600" indent="-228600" algn="l" defTabSz="914400" rtl="0" eaLnBrk="1" latinLnBrk="0" hangingPunct="1">
+              <a:lnSpc>
+                <a:spcPct val="90000"/>
+              </a:lnSpc>
+              <a:spcBef>
+                <a:spcPts val="1000"/>
+              </a:spcBef>
+              <a:buFont typeface="Arial" panose="020B0604020202020204" pitchFamily="34" charset="0"/>
+              <a:buChar char="•"/>
+              <a:defRPr sz="2800" kern="1200">
+                <a:solidFill>
+                  <a:schemeClr val="tx1"/>
+                </a:solidFill>
+                <a:latin typeface="+mn-lt"/>
+                <a:ea typeface="+mn-ea"/>
+                <a:cs typeface="+mn-cs"/>
+              </a:defRPr>
+            </a:lvl1pPr>
+            <a:lvl2pPr marL="685800" indent="-228600" algn="l" defTabSz="914400" rtl="0" eaLnBrk="1" latinLnBrk="0" hangingPunct="1">
+              <a:lnSpc>
+                <a:spcPct val="90000"/>
+              </a:lnSpc>
+              <a:spcBef>
+                <a:spcPts val="500"/>
+              </a:spcBef>
+              <a:buFont typeface="Arial" panose="020B0604020202020204" pitchFamily="34" charset="0"/>
+              <a:buChar char="•"/>
+              <a:defRPr sz="2400" kern="1200">
+                <a:solidFill>
+                  <a:schemeClr val="tx1"/>
+                </a:solidFill>
+                <a:latin typeface="+mn-lt"/>
+                <a:ea typeface="+mn-ea"/>
+                <a:cs typeface="+mn-cs"/>
+              </a:defRPr>
+            </a:lvl2pPr>
+            <a:lvl3pPr marL="1143000" indent="-228600" algn="l" defTabSz="914400" rtl="0" eaLnBrk="1" latinLnBrk="0" hangingPunct="1">
+              <a:lnSpc>
+                <a:spcPct val="90000"/>
+              </a:lnSpc>
+              <a:spcBef>
+                <a:spcPts val="500"/>
+              </a:spcBef>
+              <a:buFont typeface="Arial" panose="020B0604020202020204" pitchFamily="34" charset="0"/>
+              <a:buChar char="•"/>
+              <a:defRPr sz="2000" kern="1200">
+                <a:solidFill>
+                  <a:schemeClr val="tx1"/>
+                </a:solidFill>
+                <a:latin typeface="+mn-lt"/>
+                <a:ea typeface="+mn-ea"/>
+                <a:cs typeface="+mn-cs"/>
+              </a:defRPr>
+            </a:lvl3pPr>
+            <a:lvl4pPr marL="1600200" indent="-228600" algn="l" defTabSz="914400" rtl="0" eaLnBrk="1" latinLnBrk="0" hangingPunct="1">
+              <a:lnSpc>
+                <a:spcPct val="90000"/>
+              </a:lnSpc>
+              <a:spcBef>
+                <a:spcPts val="500"/>
+              </a:spcBef>
+              <a:buFont typeface="Arial" panose="020B0604020202020204" pitchFamily="34" charset="0"/>
+              <a:buChar char="•"/>
+              <a:defRPr sz="1800" kern="1200">
+                <a:solidFill>
+                  <a:schemeClr val="tx1"/>
+                </a:solidFill>
+                <a:latin typeface="+mn-lt"/>
+                <a:ea typeface="+mn-ea"/>
+                <a:cs typeface="+mn-cs"/>
+              </a:defRPr>
+            </a:lvl4pPr>
+            <a:lvl5pPr marL="2057400" indent="-228600" algn="l" defTabSz="914400" rtl="0" eaLnBrk="1" latinLnBrk="0" hangingPunct="1">
+              <a:lnSpc>
+                <a:spcPct val="90000"/>
+              </a:lnSpc>
+              <a:spcBef>
+                <a:spcPts val="500"/>
+              </a:spcBef>
+              <a:buFont typeface="Arial" panose="020B0604020202020204" pitchFamily="34" charset="0"/>
+              <a:buChar char="•"/>
+              <a:defRPr sz="1800" kern="1200">
+                <a:solidFill>
+                  <a:schemeClr val="tx1"/>
+                </a:solidFill>
+                <a:latin typeface="+mn-lt"/>
+                <a:ea typeface="+mn-ea"/>
+                <a:cs typeface="+mn-cs"/>
+              </a:defRPr>
+            </a:lvl5pPr>
+            <a:lvl6pPr marL="2514600" indent="-228600" algn="l" defTabSz="914400" rtl="0" eaLnBrk="1" latinLnBrk="0" hangingPunct="1">
+              <a:lnSpc>
+                <a:spcPct val="90000"/>
+              </a:lnSpc>
+              <a:spcBef>
+                <a:spcPts val="500"/>
+              </a:spcBef>
+              <a:buFont typeface="Arial" panose="020B0604020202020204" pitchFamily="34" charset="0"/>
+              <a:buChar char="•"/>
+              <a:defRPr sz="1800" kern="1200">
+                <a:solidFill>
+                  <a:schemeClr val="tx1"/>
+                </a:solidFill>
+                <a:latin typeface="+mn-lt"/>
+                <a:ea typeface="+mn-ea"/>
+                <a:cs typeface="+mn-cs"/>
+              </a:defRPr>
+            </a:lvl6pPr>
+            <a:lvl7pPr marL="2971800" indent="-228600" algn="l" defTabSz="914400" rtl="0" eaLnBrk="1" latinLnBrk="0" hangingPunct="1">
+              <a:lnSpc>
+                <a:spcPct val="90000"/>
+              </a:lnSpc>
+              <a:spcBef>
+                <a:spcPts val="500"/>
+              </a:spcBef>
+              <a:buFont typeface="Arial" panose="020B0604020202020204" pitchFamily="34" charset="0"/>
+              <a:buChar char="•"/>
+              <a:defRPr sz="1800" kern="1200">
+                <a:solidFill>
+                  <a:schemeClr val="tx1"/>
+                </a:solidFill>
+                <a:latin typeface="+mn-lt"/>
+                <a:ea typeface="+mn-ea"/>
+                <a:cs typeface="+mn-cs"/>
+              </a:defRPr>
+            </a:lvl7pPr>
+            <a:lvl8pPr marL="3429000" indent="-228600" algn="l" defTabSz="914400" rtl="0" eaLnBrk="1" latinLnBrk="0" hangingPunct="1">
+              <a:lnSpc>
+                <a:spcPct val="90000"/>
+              </a:lnSpc>
+              <a:spcBef>
+                <a:spcPts val="500"/>
+              </a:spcBef>
+              <a:buFont typeface="Arial" panose="020B0604020202020204" pitchFamily="34" charset="0"/>
+              <a:buChar char="•"/>
+              <a:defRPr sz="1800" kern="1200">
+                <a:solidFill>
+                  <a:schemeClr val="tx1"/>
+                </a:solidFill>
+                <a:latin typeface="+mn-lt"/>
+                <a:ea typeface="+mn-ea"/>
+                <a:cs typeface="+mn-cs"/>
+              </a:defRPr>
+            </a:lvl8pPr>
+            <a:lvl9pPr marL="3886200" indent="-228600" algn="l" defTabSz="914400" rtl="0" eaLnBrk="1" latinLnBrk="0" hangingPunct="1">
+              <a:lnSpc>
+                <a:spcPct val="90000"/>
+              </a:lnSpc>
+              <a:spcBef>
+                <a:spcPts val="500"/>
+              </a:spcBef>
+              <a:buFont typeface="Arial" panose="020B0604020202020204" pitchFamily="34" charset="0"/>
+              <a:buChar char="•"/>
+              <a:defRPr sz="1800" kern="1200">
+                <a:solidFill>
+                  <a:schemeClr val="tx1"/>
+                </a:solidFill>
+                <a:latin typeface="+mn-lt"/>
+                <a:ea typeface="+mn-ea"/>
+                <a:cs typeface="+mn-cs"/>
+              </a:defRPr>
+            </a:lvl9pPr>
+          </a:lstStyle>
+          <a:p>
+            <a:endParaRPr lang="it-CH" sz="3200" dirty="0" smtClean="0"/>
+          </a:p>
+          <a:p>
+            <a:endParaRPr lang="it-CH" sz="3200" dirty="0" smtClean="0"/>
+          </a:p>
+          <a:p>
+            <a:pPr lvl="7"/>
+            <a:r>
+              <a:rPr lang="it-CH" sz="3200" dirty="0" smtClean="0"/>
+              <a:t>Test modalità</a:t>
+            </a:r>
+          </a:p>
+          <a:p>
+            <a:pPr lvl="7"/>
+            <a:r>
+              <a:rPr lang="it-CH" sz="3200" dirty="0" smtClean="0"/>
+              <a:t>Test procedura di </a:t>
+            </a:r>
+            <a:r>
+              <a:rPr lang="it-CH" sz="3200" dirty="0" err="1" smtClean="0"/>
+              <a:t>check</a:t>
+            </a:r>
+            <a:r>
+              <a:rPr lang="it-CH" sz="3200" dirty="0" smtClean="0"/>
+              <a:t>	</a:t>
+            </a:r>
+          </a:p>
+        </p:txBody>
+      </p:sp>
+    </p:spTree>
+    <p:extLst>
+      <p:ext uri="{BB962C8B-B14F-4D97-AF65-F5344CB8AC3E}">
+        <p14:creationId xmlns:p14="http://schemas.microsoft.com/office/powerpoint/2010/main" val="238423913"/>
+      </p:ext>
+    </p:extLst>
+  </p:cSld>
+  <p:clrMapOvr>
+    <a:masterClrMapping/>
+  </p:clrMapOvr>
+  <p:timing>
+    <p:tnLst>
+      <p:par>
+        <p:cTn id="1" dur="indefinite" restart="never" nodeType="tmRoot"/>
+      </p:par>
+    </p:tnLst>
+  </p:timing>
+</p:sld>
+</file>
+
+<file path=ppt/slides/slide16.xml><?xml version="1.0" encoding="utf-8"?>
+<p:sld xmlns:a="http://schemas.openxmlformats.org/drawingml/2006/main" xmlns:r="http://schemas.openxmlformats.org/officeDocument/2006/relationships" xmlns:p="http://schemas.openxmlformats.org/presentationml/2006/main">
+  <p:cSld>
+    <p:spTree>
+      <p:nvGrpSpPr>
+        <p:cNvPr id="1" name=""/>
+        <p:cNvGrpSpPr/>
+        <p:nvPr/>
+      </p:nvGrpSpPr>
+      <p:grpSpPr>
+        <a:xfrm>
+          <a:off x="0" y="0"/>
+          <a:ext cx="0" cy="0"/>
+          <a:chOff x="0" y="0"/>
+          <a:chExt cx="0" cy="0"/>
+        </a:xfrm>
+      </p:grpSpPr>
+      <p:sp>
+        <p:nvSpPr>
+          <p:cNvPr id="2" name="Titolo 1"/>
+          <p:cNvSpPr>
+            <a:spLocks noGrp="1"/>
+          </p:cNvSpPr>
+          <p:nvPr>
+            <p:ph type="title"/>
+          </p:nvPr>
+        </p:nvSpPr>
+        <p:spPr/>
+        <p:txBody>
+          <a:bodyPr/>
+          <a:lstStyle/>
+          <a:p>
+            <a:r>
+              <a:rPr lang="it-CH" dirty="0" smtClean="0"/>
+              <a:t>Limitazioni.</a:t>
+            </a:r>
+            <a:endParaRPr lang="it-IT" dirty="0"/>
+          </a:p>
+        </p:txBody>
+      </p:sp>
+      <p:sp>
+        <p:nvSpPr>
+          <p:cNvPr id="4" name="Segnaposto contenuto 2"/>
+          <p:cNvSpPr>
+            <a:spLocks noGrp="1"/>
+          </p:cNvSpPr>
+          <p:nvPr>
+            <p:ph idx="1"/>
+          </p:nvPr>
+        </p:nvSpPr>
+        <p:spPr>
+          <a:xfrm>
+            <a:off x="838200" y="1925053"/>
+            <a:ext cx="10515600" cy="4932947"/>
+          </a:xfrm>
+        </p:spPr>
+        <p:txBody>
+          <a:bodyPr>
+            <a:normAutofit/>
+          </a:bodyPr>
+          <a:lstStyle/>
+          <a:p>
+            <a:endParaRPr lang="it-CH" sz="3200" dirty="0" smtClean="0"/>
+          </a:p>
+          <a:p>
+            <a:endParaRPr lang="it-CH" sz="3200" dirty="0"/>
+          </a:p>
+          <a:p>
+            <a:pPr lvl="7"/>
+            <a:r>
+              <a:rPr lang="it-CH" sz="3200" dirty="0" smtClean="0"/>
+              <a:t>Programma n° 5</a:t>
+            </a:r>
+          </a:p>
+          <a:p>
+            <a:pPr lvl="7"/>
+            <a:r>
+              <a:rPr lang="it-CH" sz="3200" dirty="0" smtClean="0"/>
+              <a:t>LED</a:t>
+            </a:r>
+          </a:p>
+          <a:p>
+            <a:pPr lvl="7"/>
+            <a:endParaRPr lang="it-IT" sz="3200" dirty="0"/>
+          </a:p>
+        </p:txBody>
+      </p:sp>
+    </p:spTree>
+    <p:extLst>
+      <p:ext uri="{BB962C8B-B14F-4D97-AF65-F5344CB8AC3E}">
+        <p14:creationId xmlns:p14="http://schemas.microsoft.com/office/powerpoint/2010/main" val="3968864345"/>
+      </p:ext>
+    </p:extLst>
+  </p:cSld>
+  <p:clrMapOvr>
+    <a:masterClrMapping/>
+  </p:clrMapOvr>
+  <p:timing>
+    <p:tnLst>
+      <p:par>
+        <p:cTn id="1" dur="indefinite" restart="never" nodeType="tmRoot"/>
+      </p:par>
+    </p:tnLst>
+  </p:timing>
+</p:sld>
+</file>
+
+<file path=ppt/slides/slide17.xml><?xml version="1.0" encoding="utf-8"?>
+<p:sld xmlns:a="http://schemas.openxmlformats.org/drawingml/2006/main" xmlns:r="http://schemas.openxmlformats.org/officeDocument/2006/relationships" xmlns:p="http://schemas.openxmlformats.org/presentationml/2006/main">
+  <p:cSld>
+    <p:spTree>
+      <p:nvGrpSpPr>
+        <p:cNvPr id="1" name=""/>
+        <p:cNvGrpSpPr/>
+        <p:nvPr/>
+      </p:nvGrpSpPr>
+      <p:grpSpPr>
+        <a:xfrm>
+          <a:off x="0" y="0"/>
+          <a:ext cx="0" cy="0"/>
+          <a:chOff x="0" y="0"/>
+          <a:chExt cx="0" cy="0"/>
+        </a:xfrm>
+      </p:grpSpPr>
+      <p:sp>
+        <p:nvSpPr>
+          <p:cNvPr id="2" name="Titolo 1"/>
+          <p:cNvSpPr>
+            <a:spLocks noGrp="1"/>
+          </p:cNvSpPr>
+          <p:nvPr>
+            <p:ph type="title"/>
+          </p:nvPr>
+        </p:nvSpPr>
+        <p:spPr/>
+        <p:txBody>
+          <a:bodyPr/>
+          <a:lstStyle/>
+          <a:p>
+            <a:r>
+              <a:rPr lang="it-CH" dirty="0" smtClean="0"/>
               <a:t>Sviluppi futuri.</a:t>
             </a:r>
             <a:endParaRPr lang="it-IT" dirty="0"/>
@@ -4527,7 +4963,7 @@
 </p:sld>
 </file>
 
-<file path=ppt/slides/slide16.xml><?xml version="1.0" encoding="utf-8"?>
+<file path=ppt/slides/slide18.xml><?xml version="1.0" encoding="utf-8"?>
 <p:sld xmlns:a="http://schemas.openxmlformats.org/drawingml/2006/main" xmlns:r="http://schemas.openxmlformats.org/officeDocument/2006/relationships" xmlns:p="http://schemas.openxmlformats.org/presentationml/2006/main">
   <p:cSld>
     <p:spTree>

</xml_diff>

<commit_message>
added consuntivo into presentation
</commit_message>
<xml_diff>
--- a/Presentations/Presentazione.pptx
+++ b/Presentations/Presentazione.pptx
@@ -5,7 +5,7 @@
     <p:sldMasterId id="2147483648" r:id="rId1"/>
   </p:sldMasterIdLst>
   <p:notesMasterIdLst>
-    <p:notesMasterId r:id="rId22"/>
+    <p:notesMasterId r:id="rId24"/>
   </p:notesMasterIdLst>
   <p:sldIdLst>
     <p:sldId id="256" r:id="rId2"/>
@@ -17,17 +17,19 @@
     <p:sldId id="274" r:id="rId8"/>
     <p:sldId id="275" r:id="rId9"/>
     <p:sldId id="266" r:id="rId10"/>
-    <p:sldId id="263" r:id="rId11"/>
-    <p:sldId id="268" r:id="rId12"/>
-    <p:sldId id="269" r:id="rId13"/>
-    <p:sldId id="273" r:id="rId14"/>
-    <p:sldId id="270" r:id="rId15"/>
-    <p:sldId id="271" r:id="rId16"/>
-    <p:sldId id="272" r:id="rId17"/>
-    <p:sldId id="264" r:id="rId18"/>
-    <p:sldId id="267" r:id="rId19"/>
-    <p:sldId id="265" r:id="rId20"/>
-    <p:sldId id="259" r:id="rId21"/>
+    <p:sldId id="276" r:id="rId11"/>
+    <p:sldId id="277" r:id="rId12"/>
+    <p:sldId id="263" r:id="rId13"/>
+    <p:sldId id="268" r:id="rId14"/>
+    <p:sldId id="269" r:id="rId15"/>
+    <p:sldId id="273" r:id="rId16"/>
+    <p:sldId id="270" r:id="rId17"/>
+    <p:sldId id="271" r:id="rId18"/>
+    <p:sldId id="272" r:id="rId19"/>
+    <p:sldId id="264" r:id="rId20"/>
+    <p:sldId id="267" r:id="rId21"/>
+    <p:sldId id="265" r:id="rId22"/>
+    <p:sldId id="259" r:id="rId23"/>
   </p:sldIdLst>
   <p:sldSz cx="12192000" cy="6858000"/>
   <p:notesSz cx="6858000" cy="9144000"/>
@@ -216,7 +218,7 @@
           <a:p>
             <a:fld id="{152D4747-CBEA-4A11-90BA-47D5349A88AA}" type="datetimeFigureOut">
               <a:rPr lang="it-IT" smtClean="0"/>
-              <a:t>10/05/2019</a:t>
+              <a:t>17/05/2019</a:t>
             </a:fld>
             <a:endParaRPr lang="it-IT"/>
           </a:p>
@@ -540,11 +542,7 @@
             </a:pPr>
             <a:r>
               <a:rPr lang="it-CH" dirty="0" smtClean="0"/>
-              <a:t>Misurare: chi prova il nostro </a:t>
-            </a:r>
-            <a:r>
-              <a:rPr lang="it-CH" dirty="0" smtClean="0"/>
-              <a:t>sistema</a:t>
+              <a:t>Misurare: chi prova il nostro sistema</a:t>
             </a:r>
           </a:p>
           <a:p>
@@ -1031,7 +1029,7 @@
           <a:p>
             <a:fld id="{EC946105-561A-4569-8BDB-2855F3E534B9}" type="slidenum">
               <a:rPr lang="it-IT" smtClean="0"/>
-              <a:t>17</a:t>
+              <a:t>19</a:t>
             </a:fld>
             <a:endParaRPr lang="it-IT"/>
           </a:p>
@@ -1119,7 +1117,7 @@
           <a:p>
             <a:fld id="{EC946105-561A-4569-8BDB-2855F3E534B9}" type="slidenum">
               <a:rPr lang="it-IT" smtClean="0"/>
-              <a:t>18</a:t>
+              <a:t>20</a:t>
             </a:fld>
             <a:endParaRPr lang="it-IT"/>
           </a:p>
@@ -1241,7 +1239,7 @@
           <a:p>
             <a:fld id="{EC946105-561A-4569-8BDB-2855F3E534B9}" type="slidenum">
               <a:rPr lang="it-IT" smtClean="0"/>
-              <a:t>19</a:t>
+              <a:t>21</a:t>
             </a:fld>
             <a:endParaRPr lang="it-IT"/>
           </a:p>
@@ -1325,7 +1323,7 @@
           <a:p>
             <a:fld id="{EC946105-561A-4569-8BDB-2855F3E534B9}" type="slidenum">
               <a:rPr lang="it-IT" smtClean="0"/>
-              <a:t>20</a:t>
+              <a:t>22</a:t>
             </a:fld>
             <a:endParaRPr lang="it-IT"/>
           </a:p>
@@ -1475,7 +1473,7 @@
           <a:p>
             <a:fld id="{A7993604-91A5-4AD4-B379-9AD64B0366D4}" type="datetimeFigureOut">
               <a:rPr lang="it-IT" smtClean="0"/>
-              <a:t>10/05/2019</a:t>
+              <a:t>17/05/2019</a:t>
             </a:fld>
             <a:endParaRPr lang="it-IT"/>
           </a:p>
@@ -1645,7 +1643,7 @@
           <a:p>
             <a:fld id="{A7993604-91A5-4AD4-B379-9AD64B0366D4}" type="datetimeFigureOut">
               <a:rPr lang="it-IT" smtClean="0"/>
-              <a:t>10/05/2019</a:t>
+              <a:t>17/05/2019</a:t>
             </a:fld>
             <a:endParaRPr lang="it-IT"/>
           </a:p>
@@ -1825,7 +1823,7 @@
           <a:p>
             <a:fld id="{A7993604-91A5-4AD4-B379-9AD64B0366D4}" type="datetimeFigureOut">
               <a:rPr lang="it-IT" smtClean="0"/>
-              <a:t>10/05/2019</a:t>
+              <a:t>17/05/2019</a:t>
             </a:fld>
             <a:endParaRPr lang="it-IT"/>
           </a:p>
@@ -1995,7 +1993,7 @@
           <a:p>
             <a:fld id="{A7993604-91A5-4AD4-B379-9AD64B0366D4}" type="datetimeFigureOut">
               <a:rPr lang="it-IT" smtClean="0"/>
-              <a:t>10/05/2019</a:t>
+              <a:t>17/05/2019</a:t>
             </a:fld>
             <a:endParaRPr lang="it-IT"/>
           </a:p>
@@ -2241,7 +2239,7 @@
           <a:p>
             <a:fld id="{A7993604-91A5-4AD4-B379-9AD64B0366D4}" type="datetimeFigureOut">
               <a:rPr lang="it-IT" smtClean="0"/>
-              <a:t>10/05/2019</a:t>
+              <a:t>17/05/2019</a:t>
             </a:fld>
             <a:endParaRPr lang="it-IT"/>
           </a:p>
@@ -2473,7 +2471,7 @@
           <a:p>
             <a:fld id="{A7993604-91A5-4AD4-B379-9AD64B0366D4}" type="datetimeFigureOut">
               <a:rPr lang="it-IT" smtClean="0"/>
-              <a:t>10/05/2019</a:t>
+              <a:t>17/05/2019</a:t>
             </a:fld>
             <a:endParaRPr lang="it-IT"/>
           </a:p>
@@ -2840,7 +2838,7 @@
           <a:p>
             <a:fld id="{A7993604-91A5-4AD4-B379-9AD64B0366D4}" type="datetimeFigureOut">
               <a:rPr lang="it-IT" smtClean="0"/>
-              <a:t>10/05/2019</a:t>
+              <a:t>17/05/2019</a:t>
             </a:fld>
             <a:endParaRPr lang="it-IT"/>
           </a:p>
@@ -2958,7 +2956,7 @@
           <a:p>
             <a:fld id="{A7993604-91A5-4AD4-B379-9AD64B0366D4}" type="datetimeFigureOut">
               <a:rPr lang="it-IT" smtClean="0"/>
-              <a:t>10/05/2019</a:t>
+              <a:t>17/05/2019</a:t>
             </a:fld>
             <a:endParaRPr lang="it-IT"/>
           </a:p>
@@ -3053,7 +3051,7 @@
           <a:p>
             <a:fld id="{A7993604-91A5-4AD4-B379-9AD64B0366D4}" type="datetimeFigureOut">
               <a:rPr lang="it-IT" smtClean="0"/>
-              <a:t>10/05/2019</a:t>
+              <a:t>17/05/2019</a:t>
             </a:fld>
             <a:endParaRPr lang="it-IT"/>
           </a:p>
@@ -3330,7 +3328,7 @@
           <a:p>
             <a:fld id="{A7993604-91A5-4AD4-B379-9AD64B0366D4}" type="datetimeFigureOut">
               <a:rPr lang="it-IT" smtClean="0"/>
-              <a:t>10/05/2019</a:t>
+              <a:t>17/05/2019</a:t>
             </a:fld>
             <a:endParaRPr lang="it-IT"/>
           </a:p>
@@ -3583,7 +3581,7 @@
           <a:p>
             <a:fld id="{A7993604-91A5-4AD4-B379-9AD64B0366D4}" type="datetimeFigureOut">
               <a:rPr lang="it-IT" smtClean="0"/>
-              <a:t>10/05/2019</a:t>
+              <a:t>17/05/2019</a:t>
             </a:fld>
             <a:endParaRPr lang="it-IT"/>
           </a:p>
@@ -3796,7 +3794,7 @@
           <a:p>
             <a:fld id="{A7993604-91A5-4AD4-B379-9AD64B0366D4}" type="datetimeFigureOut">
               <a:rPr lang="it-IT" smtClean="0"/>
-              <a:t>10/05/2019</a:t>
+              <a:t>17/05/2019</a:t>
             </a:fld>
             <a:endParaRPr lang="it-IT"/>
           </a:p>
@@ -4331,6 +4329,138 @@
           <a:chExt cx="0" cy="0"/>
         </a:xfrm>
       </p:grpSpPr>
+      <p:pic>
+        <p:nvPicPr>
+          <p:cNvPr id="2" name="Immagine 1"/>
+          <p:cNvPicPr>
+            <a:picLocks noChangeAspect="1"/>
+          </p:cNvPicPr>
+          <p:nvPr/>
+        </p:nvPicPr>
+        <p:blipFill>
+          <a:blip r:embed="rId2">
+            <a:extLst>
+              <a:ext uri="{28A0092B-C50C-407E-A947-70E740481C1C}">
+                <a14:useLocalDpi xmlns:a14="http://schemas.microsoft.com/office/drawing/2010/main" val="0"/>
+              </a:ext>
+            </a:extLst>
+          </a:blip>
+          <a:stretch>
+            <a:fillRect/>
+          </a:stretch>
+        </p:blipFill>
+        <p:spPr>
+          <a:xfrm>
+            <a:off x="0" y="0"/>
+            <a:ext cx="12191999" cy="8153400"/>
+          </a:xfrm>
+          <a:prstGeom prst="rect">
+            <a:avLst/>
+          </a:prstGeom>
+        </p:spPr>
+      </p:pic>
+    </p:spTree>
+    <p:extLst>
+      <p:ext uri="{BB962C8B-B14F-4D97-AF65-F5344CB8AC3E}">
+        <p14:creationId xmlns:p14="http://schemas.microsoft.com/office/powerpoint/2010/main" val="2997106683"/>
+      </p:ext>
+    </p:extLst>
+  </p:cSld>
+  <p:clrMapOvr>
+    <a:masterClrMapping/>
+  </p:clrMapOvr>
+  <p:timing>
+    <p:tnLst>
+      <p:par>
+        <p:cTn id="1" dur="indefinite" restart="never" nodeType="tmRoot"/>
+      </p:par>
+    </p:tnLst>
+  </p:timing>
+</p:sld>
+</file>
+
+<file path=ppt/slides/slide11.xml><?xml version="1.0" encoding="utf-8"?>
+<p:sld xmlns:a="http://schemas.openxmlformats.org/drawingml/2006/main" xmlns:r="http://schemas.openxmlformats.org/officeDocument/2006/relationships" xmlns:p="http://schemas.openxmlformats.org/presentationml/2006/main">
+  <p:cSld>
+    <p:spTree>
+      <p:nvGrpSpPr>
+        <p:cNvPr id="1" name=""/>
+        <p:cNvGrpSpPr/>
+        <p:nvPr/>
+      </p:nvGrpSpPr>
+      <p:grpSpPr>
+        <a:xfrm>
+          <a:off x="0" y="0"/>
+          <a:ext cx="0" cy="0"/>
+          <a:chOff x="0" y="0"/>
+          <a:chExt cx="0" cy="0"/>
+        </a:xfrm>
+      </p:grpSpPr>
+      <p:pic>
+        <p:nvPicPr>
+          <p:cNvPr id="4" name="Segnaposto contenuto 3"/>
+          <p:cNvPicPr>
+            <a:picLocks noGrp="1" noChangeAspect="1"/>
+          </p:cNvPicPr>
+          <p:nvPr>
+            <p:ph idx="1"/>
+          </p:nvPr>
+        </p:nvPicPr>
+        <p:blipFill rotWithShape="1">
+          <a:blip r:embed="rId2" cstate="print">
+            <a:extLst>
+              <a:ext uri="{28A0092B-C50C-407E-A947-70E740481C1C}">
+                <a14:useLocalDpi xmlns:a14="http://schemas.microsoft.com/office/drawing/2010/main" val="0"/>
+              </a:ext>
+            </a:extLst>
+          </a:blip>
+          <a:srcRect t="34249"/>
+          <a:stretch/>
+        </p:blipFill>
+        <p:spPr>
+          <a:xfrm>
+            <a:off x="0" y="21770"/>
+            <a:ext cx="12191999" cy="6836229"/>
+          </a:xfrm>
+        </p:spPr>
+      </p:pic>
+    </p:spTree>
+    <p:extLst>
+      <p:ext uri="{BB962C8B-B14F-4D97-AF65-F5344CB8AC3E}">
+        <p14:creationId xmlns:p14="http://schemas.microsoft.com/office/powerpoint/2010/main" val="692912054"/>
+      </p:ext>
+    </p:extLst>
+  </p:cSld>
+  <p:clrMapOvr>
+    <a:masterClrMapping/>
+  </p:clrMapOvr>
+  <p:timing>
+    <p:tnLst>
+      <p:par>
+        <p:cTn id="1" dur="indefinite" restart="never" nodeType="tmRoot"/>
+      </p:par>
+    </p:tnLst>
+  </p:timing>
+</p:sld>
+</file>
+
+<file path=ppt/slides/slide12.xml><?xml version="1.0" encoding="utf-8"?>
+<p:sld xmlns:a="http://schemas.openxmlformats.org/drawingml/2006/main" xmlns:r="http://schemas.openxmlformats.org/officeDocument/2006/relationships" xmlns:p="http://schemas.openxmlformats.org/presentationml/2006/main">
+  <p:cSld>
+    <p:spTree>
+      <p:nvGrpSpPr>
+        <p:cNvPr id="1" name=""/>
+        <p:cNvGrpSpPr/>
+        <p:nvPr/>
+      </p:nvGrpSpPr>
+      <p:grpSpPr>
+        <a:xfrm>
+          <a:off x="0" y="0"/>
+          <a:ext cx="0" cy="0"/>
+          <a:chOff x="0" y="0"/>
+          <a:chExt cx="0" cy="0"/>
+        </a:xfrm>
+      </p:grpSpPr>
       <p:sp>
         <p:nvSpPr>
           <p:cNvPr id="2" name="Titolo 1"/>
@@ -4403,7 +4533,7 @@
 </p:sld>
 </file>
 
-<file path=ppt/slides/slide11.xml><?xml version="1.0" encoding="utf-8"?>
+<file path=ppt/slides/slide13.xml><?xml version="1.0" encoding="utf-8"?>
 <p:sld xmlns:a="http://schemas.openxmlformats.org/drawingml/2006/main" xmlns:r="http://schemas.openxmlformats.org/officeDocument/2006/relationships" xmlns:p="http://schemas.openxmlformats.org/presentationml/2006/main">
   <p:cSld>
     <p:spTree>
@@ -4469,7 +4599,7 @@
 </p:sld>
 </file>
 
-<file path=ppt/slides/slide12.xml><?xml version="1.0" encoding="utf-8"?>
+<file path=ppt/slides/slide14.xml><?xml version="1.0" encoding="utf-8"?>
 <p:sld xmlns:a="http://schemas.openxmlformats.org/drawingml/2006/main" xmlns:r="http://schemas.openxmlformats.org/officeDocument/2006/relationships" xmlns:p="http://schemas.openxmlformats.org/presentationml/2006/main">
   <p:cSld>
     <p:spTree>
@@ -4566,7 +4696,7 @@
 </p:sld>
 </file>
 
-<file path=ppt/slides/slide13.xml><?xml version="1.0" encoding="utf-8"?>
+<file path=ppt/slides/slide15.xml><?xml version="1.0" encoding="utf-8"?>
 <p:sld xmlns:a="http://schemas.openxmlformats.org/drawingml/2006/main" xmlns:r="http://schemas.openxmlformats.org/officeDocument/2006/relationships" xmlns:p="http://schemas.openxmlformats.org/presentationml/2006/main">
   <p:cSld>
     <p:spTree>
@@ -4681,7 +4811,7 @@
 </p:sld>
 </file>
 
-<file path=ppt/slides/slide14.xml><?xml version="1.0" encoding="utf-8"?>
+<file path=ppt/slides/slide16.xml><?xml version="1.0" encoding="utf-8"?>
 <p:sld xmlns:a="http://schemas.openxmlformats.org/drawingml/2006/main" xmlns:r="http://schemas.openxmlformats.org/officeDocument/2006/relationships" xmlns:p="http://schemas.openxmlformats.org/presentationml/2006/main">
   <p:cSld>
     <p:spTree>
@@ -4777,7 +4907,7 @@
 </p:sld>
 </file>
 
-<file path=ppt/slides/slide15.xml><?xml version="1.0" encoding="utf-8"?>
+<file path=ppt/slides/slide17.xml><?xml version="1.0" encoding="utf-8"?>
 <p:sld xmlns:a="http://schemas.openxmlformats.org/drawingml/2006/main" xmlns:r="http://schemas.openxmlformats.org/officeDocument/2006/relationships" xmlns:p="http://schemas.openxmlformats.org/presentationml/2006/main">
   <p:cSld>
     <p:spTree>
@@ -4873,7 +5003,7 @@
 </p:sld>
 </file>
 
-<file path=ppt/slides/slide16.xml><?xml version="1.0" encoding="utf-8"?>
+<file path=ppt/slides/slide18.xml><?xml version="1.0" encoding="utf-8"?>
 <p:sld xmlns:a="http://schemas.openxmlformats.org/drawingml/2006/main" xmlns:r="http://schemas.openxmlformats.org/officeDocument/2006/relationships" xmlns:p="http://schemas.openxmlformats.org/presentationml/2006/main">
   <p:cSld>
     <p:spTree>
@@ -4969,7 +5099,7 @@
 </p:sld>
 </file>
 
-<file path=ppt/slides/slide17.xml><?xml version="1.0" encoding="utf-8"?>
+<file path=ppt/slides/slide19.xml><?xml version="1.0" encoding="utf-8"?>
 <p:sld xmlns:a="http://schemas.openxmlformats.org/drawingml/2006/main" xmlns:r="http://schemas.openxmlformats.org/officeDocument/2006/relationships" xmlns:p="http://schemas.openxmlformats.org/presentationml/2006/main">
   <p:cSld>
     <p:spTree>
@@ -5069,7 +5199,146 @@
 </p:sld>
 </file>
 
-<file path=ppt/slides/slide18.xml><?xml version="1.0" encoding="utf-8"?>
+<file path=ppt/slides/slide2.xml><?xml version="1.0" encoding="utf-8"?>
+<p:sld xmlns:a="http://schemas.openxmlformats.org/drawingml/2006/main" xmlns:r="http://schemas.openxmlformats.org/officeDocument/2006/relationships" xmlns:p="http://schemas.openxmlformats.org/presentationml/2006/main">
+  <p:cSld>
+    <p:spTree>
+      <p:nvGrpSpPr>
+        <p:cNvPr id="1" name=""/>
+        <p:cNvGrpSpPr/>
+        <p:nvPr/>
+      </p:nvGrpSpPr>
+      <p:grpSpPr>
+        <a:xfrm>
+          <a:off x="0" y="0"/>
+          <a:ext cx="0" cy="0"/>
+          <a:chOff x="0" y="0"/>
+          <a:chExt cx="0" cy="0"/>
+        </a:xfrm>
+      </p:grpSpPr>
+      <p:sp>
+        <p:nvSpPr>
+          <p:cNvPr id="2" name="Titolo 1"/>
+          <p:cNvSpPr>
+            <a:spLocks noGrp="1"/>
+          </p:cNvSpPr>
+          <p:nvPr>
+            <p:ph type="title"/>
+          </p:nvPr>
+        </p:nvSpPr>
+        <p:spPr/>
+        <p:txBody>
+          <a:bodyPr/>
+          <a:lstStyle/>
+          <a:p>
+            <a:r>
+              <a:rPr lang="it-CH" dirty="0" smtClean="0"/>
+              <a:t>Su di noi.</a:t>
+            </a:r>
+            <a:endParaRPr lang="it-IT" dirty="0"/>
+          </a:p>
+        </p:txBody>
+      </p:sp>
+      <p:sp>
+        <p:nvSpPr>
+          <p:cNvPr id="3" name="Segnaposto contenuto 2"/>
+          <p:cNvSpPr>
+            <a:spLocks noGrp="1"/>
+          </p:cNvSpPr>
+          <p:nvPr>
+            <p:ph idx="1"/>
+          </p:nvPr>
+        </p:nvSpPr>
+        <p:spPr/>
+        <p:txBody>
+          <a:bodyPr/>
+          <a:lstStyle/>
+          <a:p>
+            <a:r>
+              <a:rPr lang="it-CH" dirty="0" smtClean="0"/>
+              <a:t>Bryan Beffa</a:t>
+            </a:r>
+          </a:p>
+          <a:p>
+            <a:pPr marL="457200" lvl="1" indent="0">
+              <a:buNone/>
+            </a:pPr>
+            <a:r>
+              <a:rPr lang="it-CH" dirty="0"/>
+              <a:t>b</a:t>
+            </a:r>
+            <a:r>
+              <a:rPr lang="it-CH" dirty="0" smtClean="0"/>
+              <a:t>ryan.beffa@samtrevano.ch</a:t>
+            </a:r>
+          </a:p>
+          <a:p>
+            <a:r>
+              <a:rPr lang="it-CH" dirty="0" smtClean="0"/>
+              <a:t>Filippo </a:t>
+            </a:r>
+            <a:r>
+              <a:rPr lang="it-CH" dirty="0" err="1" smtClean="0"/>
+              <a:t>Finke</a:t>
+            </a:r>
+            <a:endParaRPr lang="it-CH" dirty="0" smtClean="0"/>
+          </a:p>
+          <a:p>
+            <a:pPr marL="457200" lvl="1" indent="0">
+              <a:buNone/>
+            </a:pPr>
+            <a:r>
+              <a:rPr lang="it-CH" dirty="0" smtClean="0"/>
+              <a:t>filippo.finke@samtrevano.ch</a:t>
+            </a:r>
+          </a:p>
+          <a:p>
+            <a:r>
+              <a:rPr lang="it-CH" dirty="0" smtClean="0"/>
+              <a:t>Matteo </a:t>
+            </a:r>
+            <a:r>
+              <a:rPr lang="it-CH" dirty="0" err="1" smtClean="0"/>
+              <a:t>Ghilardini</a:t>
+            </a:r>
+            <a:endParaRPr lang="it-CH" dirty="0" smtClean="0"/>
+          </a:p>
+          <a:p>
+            <a:pPr marL="457200" lvl="1" indent="0">
+              <a:buNone/>
+            </a:pPr>
+            <a:r>
+              <a:rPr lang="it-CH" dirty="0"/>
+              <a:t>m</a:t>
+            </a:r>
+            <a:r>
+              <a:rPr lang="it-CH" dirty="0" smtClean="0"/>
+              <a:t>atteo.ghilardini@samtrevano.ch</a:t>
+            </a:r>
+          </a:p>
+        </p:txBody>
+      </p:sp>
+    </p:spTree>
+    <p:extLst>
+      <p:ext uri="{BB962C8B-B14F-4D97-AF65-F5344CB8AC3E}">
+        <p14:creationId xmlns:p14="http://schemas.microsoft.com/office/powerpoint/2010/main" val="2011878413"/>
+      </p:ext>
+    </p:extLst>
+  </p:cSld>
+  <p:clrMapOvr>
+    <a:masterClrMapping/>
+  </p:clrMapOvr>
+  <p:timing>
+    <p:tnLst>
+      <p:par>
+        <p:cTn id="1" dur="indefinite" restart="never" nodeType="tmRoot"/>
+      </p:par>
+    </p:tnLst>
+  </p:timing>
+</p:sld>
+</file>
+
+<file path=ppt/slides/slide20.xml><?xml version="1.0" encoding="utf-8"?>
 <p:sld xmlns:a="http://schemas.openxmlformats.org/drawingml/2006/main" xmlns:r="http://schemas.openxmlformats.org/officeDocument/2006/relationships" xmlns:p="http://schemas.openxmlformats.org/presentationml/2006/main">
   <p:cSld>
     <p:spTree>
@@ -5328,7 +5597,7 @@
 </p:sld>
 </file>
 
-<file path=ppt/slides/slide19.xml><?xml version="1.0" encoding="utf-8"?>
+<file path=ppt/slides/slide21.xml><?xml version="1.0" encoding="utf-8"?>
 <p:sld xmlns:a="http://schemas.openxmlformats.org/drawingml/2006/main" xmlns:r="http://schemas.openxmlformats.org/officeDocument/2006/relationships" xmlns:p="http://schemas.openxmlformats.org/presentationml/2006/main">
   <p:cSld>
     <p:spTree>
@@ -5594,146 +5863,7 @@
 </p:sld>
 </file>
 
-<file path=ppt/slides/slide2.xml><?xml version="1.0" encoding="utf-8"?>
-<p:sld xmlns:a="http://schemas.openxmlformats.org/drawingml/2006/main" xmlns:r="http://schemas.openxmlformats.org/officeDocument/2006/relationships" xmlns:p="http://schemas.openxmlformats.org/presentationml/2006/main">
-  <p:cSld>
-    <p:spTree>
-      <p:nvGrpSpPr>
-        <p:cNvPr id="1" name=""/>
-        <p:cNvGrpSpPr/>
-        <p:nvPr/>
-      </p:nvGrpSpPr>
-      <p:grpSpPr>
-        <a:xfrm>
-          <a:off x="0" y="0"/>
-          <a:ext cx="0" cy="0"/>
-          <a:chOff x="0" y="0"/>
-          <a:chExt cx="0" cy="0"/>
-        </a:xfrm>
-      </p:grpSpPr>
-      <p:sp>
-        <p:nvSpPr>
-          <p:cNvPr id="2" name="Titolo 1"/>
-          <p:cNvSpPr>
-            <a:spLocks noGrp="1"/>
-          </p:cNvSpPr>
-          <p:nvPr>
-            <p:ph type="title"/>
-          </p:nvPr>
-        </p:nvSpPr>
-        <p:spPr/>
-        <p:txBody>
-          <a:bodyPr/>
-          <a:lstStyle/>
-          <a:p>
-            <a:r>
-              <a:rPr lang="it-CH" dirty="0" smtClean="0"/>
-              <a:t>Su di noi.</a:t>
-            </a:r>
-            <a:endParaRPr lang="it-IT" dirty="0"/>
-          </a:p>
-        </p:txBody>
-      </p:sp>
-      <p:sp>
-        <p:nvSpPr>
-          <p:cNvPr id="3" name="Segnaposto contenuto 2"/>
-          <p:cNvSpPr>
-            <a:spLocks noGrp="1"/>
-          </p:cNvSpPr>
-          <p:nvPr>
-            <p:ph idx="1"/>
-          </p:nvPr>
-        </p:nvSpPr>
-        <p:spPr/>
-        <p:txBody>
-          <a:bodyPr/>
-          <a:lstStyle/>
-          <a:p>
-            <a:r>
-              <a:rPr lang="it-CH" dirty="0" smtClean="0"/>
-              <a:t>Bryan Beffa</a:t>
-            </a:r>
-          </a:p>
-          <a:p>
-            <a:pPr marL="457200" lvl="1" indent="0">
-              <a:buNone/>
-            </a:pPr>
-            <a:r>
-              <a:rPr lang="it-CH" dirty="0"/>
-              <a:t>b</a:t>
-            </a:r>
-            <a:r>
-              <a:rPr lang="it-CH" dirty="0" smtClean="0"/>
-              <a:t>ryan.beffa@samtrevano.ch</a:t>
-            </a:r>
-          </a:p>
-          <a:p>
-            <a:r>
-              <a:rPr lang="it-CH" dirty="0" smtClean="0"/>
-              <a:t>Filippo </a:t>
-            </a:r>
-            <a:r>
-              <a:rPr lang="it-CH" dirty="0" err="1" smtClean="0"/>
-              <a:t>Finke</a:t>
-            </a:r>
-            <a:endParaRPr lang="it-CH" dirty="0" smtClean="0"/>
-          </a:p>
-          <a:p>
-            <a:pPr marL="457200" lvl="1" indent="0">
-              <a:buNone/>
-            </a:pPr>
-            <a:r>
-              <a:rPr lang="it-CH" dirty="0" smtClean="0"/>
-              <a:t>filippo.finke@samtrevano.ch</a:t>
-            </a:r>
-          </a:p>
-          <a:p>
-            <a:r>
-              <a:rPr lang="it-CH" dirty="0" smtClean="0"/>
-              <a:t>Matteo </a:t>
-            </a:r>
-            <a:r>
-              <a:rPr lang="it-CH" dirty="0" err="1" smtClean="0"/>
-              <a:t>Ghilardini</a:t>
-            </a:r>
-            <a:endParaRPr lang="it-CH" dirty="0" smtClean="0"/>
-          </a:p>
-          <a:p>
-            <a:pPr marL="457200" lvl="1" indent="0">
-              <a:buNone/>
-            </a:pPr>
-            <a:r>
-              <a:rPr lang="it-CH" dirty="0"/>
-              <a:t>m</a:t>
-            </a:r>
-            <a:r>
-              <a:rPr lang="it-CH" dirty="0" smtClean="0"/>
-              <a:t>atteo.ghilardini@samtrevano.ch</a:t>
-            </a:r>
-          </a:p>
-        </p:txBody>
-      </p:sp>
-    </p:spTree>
-    <p:extLst>
-      <p:ext uri="{BB962C8B-B14F-4D97-AF65-F5344CB8AC3E}">
-        <p14:creationId xmlns:p14="http://schemas.microsoft.com/office/powerpoint/2010/main" val="2011878413"/>
-      </p:ext>
-    </p:extLst>
-  </p:cSld>
-  <p:clrMapOvr>
-    <a:masterClrMapping/>
-  </p:clrMapOvr>
-  <p:timing>
-    <p:tnLst>
-      <p:par>
-        <p:cTn id="1" dur="indefinite" restart="never" nodeType="tmRoot"/>
-      </p:par>
-    </p:tnLst>
-  </p:timing>
-</p:sld>
-</file>
-
-<file path=ppt/slides/slide20.xml><?xml version="1.0" encoding="utf-8"?>
+<file path=ppt/slides/slide22.xml><?xml version="1.0" encoding="utf-8"?>
 <p:sld xmlns:a="http://schemas.openxmlformats.org/drawingml/2006/main" xmlns:r="http://schemas.openxmlformats.org/officeDocument/2006/relationships" xmlns:p="http://schemas.openxmlformats.org/presentationml/2006/main">
   <p:cSld>
     <p:spTree>
@@ -6575,25 +6705,35 @@
           </a:p>
         </p:txBody>
       </p:sp>
-      <p:sp>
-        <p:nvSpPr>
-          <p:cNvPr id="3" name="Segnaposto contenuto 2"/>
-          <p:cNvSpPr>
-            <a:spLocks noGrp="1"/>
-          </p:cNvSpPr>
+      <p:pic>
+        <p:nvPicPr>
+          <p:cNvPr id="4" name="Segnaposto contenuto 3"/>
+          <p:cNvPicPr>
+            <a:picLocks noGrp="1" noChangeAspect="1"/>
+          </p:cNvPicPr>
           <p:nvPr>
             <p:ph idx="1"/>
           </p:nvPr>
-        </p:nvSpPr>
-        <p:spPr/>
-        <p:txBody>
-          <a:bodyPr/>
-          <a:lstStyle/>
-          <a:p>
-            <a:endParaRPr lang="it-IT"/>
-          </a:p>
-        </p:txBody>
-      </p:sp>
+        </p:nvPicPr>
+        <p:blipFill>
+          <a:blip r:embed="rId3" cstate="print">
+            <a:extLst>
+              <a:ext uri="{28A0092B-C50C-407E-A947-70E740481C1C}">
+                <a14:useLocalDpi xmlns:a14="http://schemas.microsoft.com/office/drawing/2010/main" val="0"/>
+              </a:ext>
+            </a:extLst>
+          </a:blip>
+          <a:stretch>
+            <a:fillRect/>
+          </a:stretch>
+        </p:blipFill>
+        <p:spPr>
+          <a:xfrm>
+            <a:off x="3350029" y="1318548"/>
+            <a:ext cx="5677592" cy="5132675"/>
+          </a:xfrm>
+        </p:spPr>
+      </p:pic>
     </p:spTree>
     <p:extLst>
       <p:ext uri="{BB962C8B-B14F-4D97-AF65-F5344CB8AC3E}">

</xml_diff>